<commit_message>
fix tomcat binary location change
</commit_message>
<xml_diff>
--- a/jenkins/JenkinsBasics.pptx
+++ b/jenkins/JenkinsBasics.pptx
@@ -272,7 +272,7 @@
           <a:p>
             <a:fld id="{F15A6252-5F50-4106-9C23-9E03A675631E}" type="datetimeFigureOut">
               <a:rPr lang="en-IN" smtClean="0"/>
-              <a:t>07-12-2020</a:t>
+              <a:t>10-12-2020</a:t>
             </a:fld>
             <a:endParaRPr lang="en-IN" dirty="0"/>
           </a:p>
@@ -5981,7 +5981,7 @@
           <a:p>
             <a:fld id="{4086692B-153F-4DFE-BFBD-A2AE2C7443B6}" type="datetimeFigureOut">
               <a:rPr lang="en-IN" smtClean="0"/>
-              <a:t>07-12-2020</a:t>
+              <a:t>10-12-2020</a:t>
             </a:fld>
             <a:endParaRPr lang="en-IN" dirty="0"/>
           </a:p>
@@ -6181,7 +6181,7 @@
           <a:p>
             <a:fld id="{4086692B-153F-4DFE-BFBD-A2AE2C7443B6}" type="datetimeFigureOut">
               <a:rPr lang="en-IN" smtClean="0"/>
-              <a:t>07-12-2020</a:t>
+              <a:t>10-12-2020</a:t>
             </a:fld>
             <a:endParaRPr lang="en-IN" dirty="0"/>
           </a:p>
@@ -6391,7 +6391,7 @@
           <a:p>
             <a:fld id="{4086692B-153F-4DFE-BFBD-A2AE2C7443B6}" type="datetimeFigureOut">
               <a:rPr lang="en-IN" smtClean="0"/>
-              <a:t>07-12-2020</a:t>
+              <a:t>10-12-2020</a:t>
             </a:fld>
             <a:endParaRPr lang="en-IN" dirty="0"/>
           </a:p>
@@ -6591,7 +6591,7 @@
           <a:p>
             <a:fld id="{4086692B-153F-4DFE-BFBD-A2AE2C7443B6}" type="datetimeFigureOut">
               <a:rPr lang="en-IN" smtClean="0"/>
-              <a:t>07-12-2020</a:t>
+              <a:t>10-12-2020</a:t>
             </a:fld>
             <a:endParaRPr lang="en-IN" dirty="0"/>
           </a:p>
@@ -6867,7 +6867,7 @@
           <a:p>
             <a:fld id="{4086692B-153F-4DFE-BFBD-A2AE2C7443B6}" type="datetimeFigureOut">
               <a:rPr lang="en-IN" smtClean="0"/>
-              <a:t>07-12-2020</a:t>
+              <a:t>10-12-2020</a:t>
             </a:fld>
             <a:endParaRPr lang="en-IN" dirty="0"/>
           </a:p>
@@ -7135,7 +7135,7 @@
           <a:p>
             <a:fld id="{4086692B-153F-4DFE-BFBD-A2AE2C7443B6}" type="datetimeFigureOut">
               <a:rPr lang="en-IN" smtClean="0"/>
-              <a:t>07-12-2020</a:t>
+              <a:t>10-12-2020</a:t>
             </a:fld>
             <a:endParaRPr lang="en-IN" dirty="0"/>
           </a:p>
@@ -7550,7 +7550,7 @@
           <a:p>
             <a:fld id="{4086692B-153F-4DFE-BFBD-A2AE2C7443B6}" type="datetimeFigureOut">
               <a:rPr lang="en-IN" smtClean="0"/>
-              <a:t>07-12-2020</a:t>
+              <a:t>10-12-2020</a:t>
             </a:fld>
             <a:endParaRPr lang="en-IN" dirty="0"/>
           </a:p>
@@ -7692,7 +7692,7 @@
           <a:p>
             <a:fld id="{4086692B-153F-4DFE-BFBD-A2AE2C7443B6}" type="datetimeFigureOut">
               <a:rPr lang="en-IN" smtClean="0"/>
-              <a:t>07-12-2020</a:t>
+              <a:t>10-12-2020</a:t>
             </a:fld>
             <a:endParaRPr lang="en-IN" dirty="0"/>
           </a:p>
@@ -7805,7 +7805,7 @@
           <a:p>
             <a:fld id="{4086692B-153F-4DFE-BFBD-A2AE2C7443B6}" type="datetimeFigureOut">
               <a:rPr lang="en-IN" smtClean="0"/>
-              <a:t>07-12-2020</a:t>
+              <a:t>10-12-2020</a:t>
             </a:fld>
             <a:endParaRPr lang="en-IN" dirty="0"/>
           </a:p>
@@ -8118,7 +8118,7 @@
           <a:p>
             <a:fld id="{4086692B-153F-4DFE-BFBD-A2AE2C7443B6}" type="datetimeFigureOut">
               <a:rPr lang="en-IN" smtClean="0"/>
-              <a:t>07-12-2020</a:t>
+              <a:t>10-12-2020</a:t>
             </a:fld>
             <a:endParaRPr lang="en-IN" dirty="0"/>
           </a:p>
@@ -8407,7 +8407,7 @@
           <a:p>
             <a:fld id="{4086692B-153F-4DFE-BFBD-A2AE2C7443B6}" type="datetimeFigureOut">
               <a:rPr lang="en-IN" smtClean="0"/>
-              <a:t>07-12-2020</a:t>
+              <a:t>10-12-2020</a:t>
             </a:fld>
             <a:endParaRPr lang="en-IN" dirty="0"/>
           </a:p>
@@ -8650,7 +8650,7 @@
           <a:p>
             <a:fld id="{4086692B-153F-4DFE-BFBD-A2AE2C7443B6}" type="datetimeFigureOut">
               <a:rPr lang="en-IN" smtClean="0"/>
-              <a:t>07-12-2020</a:t>
+              <a:t>10-12-2020</a:t>
             </a:fld>
             <a:endParaRPr lang="en-IN" dirty="0"/>
           </a:p>
@@ -17783,7 +17783,7 @@
                   <a:schemeClr val="bg1"/>
                 </a:solidFill>
               </a:rPr>
-              <a:t> Team/Slave leader and facilitator </a:t>
+              <a:t>Team/Slave leader and facilitator </a:t>
             </a:r>
           </a:p>
           <a:p>
@@ -18714,7 +18714,7 @@
         </p:nvSpPr>
         <p:spPr>
           <a:xfrm>
-            <a:off x="788096" y="1706725"/>
+            <a:off x="788096" y="1715603"/>
             <a:ext cx="10615808" cy="2585323"/>
           </a:xfrm>
           <a:prstGeom prst="rect">
@@ -18752,7 +18752,7 @@
                   <a:schemeClr val="bg1"/>
                 </a:solidFill>
               </a:rPr>
-              <a:t>Spring Backlog</a:t>
+              <a:t>Sprint Backlog</a:t>
             </a:r>
           </a:p>
           <a:p>

</xml_diff>